<commit_message>
fix: Link Roles class to Users class in Component Design
</commit_message>
<xml_diff>
--- a/project/documents/m3-ScheduleAndDesign/ScheduleAndDesign.pptx
+++ b/project/documents/m3-ScheduleAndDesign/ScheduleAndDesign.pptx
@@ -114,6 +114,11 @@
       </a:defRPr>
     </a:lvl9pPr>
   </p:defaultTextStyle>
+  <p:extLst>
+    <p:ext uri="{EFAFB233-063F-42B5-8137-9DF3F51BA10A}">
+      <p15:sldGuideLst xmlns:p15="http://schemas.microsoft.com/office/powerpoint/2012/main"/>
+    </p:ext>
+  </p:extLst>
 </p:presentation>
 </file>
 
@@ -266,7 +271,7 @@
           <a:p>
             <a:fld id="{BB4D6562-5A70-4DF7-9752-E74BCA214492}" type="datetimeFigureOut">
               <a:rPr lang="en-IN" smtClean="0"/>
-              <a:t>05-03-2023</a:t>
+              <a:t>06-03-2023</a:t>
             </a:fld>
             <a:endParaRPr lang="en-IN"/>
           </a:p>
@@ -466,7 +471,7 @@
           <a:p>
             <a:fld id="{BB4D6562-5A70-4DF7-9752-E74BCA214492}" type="datetimeFigureOut">
               <a:rPr lang="en-IN" smtClean="0"/>
-              <a:t>05-03-2023</a:t>
+              <a:t>06-03-2023</a:t>
             </a:fld>
             <a:endParaRPr lang="en-IN"/>
           </a:p>
@@ -676,7 +681,7 @@
           <a:p>
             <a:fld id="{BB4D6562-5A70-4DF7-9752-E74BCA214492}" type="datetimeFigureOut">
               <a:rPr lang="en-IN" smtClean="0"/>
-              <a:t>05-03-2023</a:t>
+              <a:t>06-03-2023</a:t>
             </a:fld>
             <a:endParaRPr lang="en-IN"/>
           </a:p>
@@ -876,7 +881,7 @@
           <a:p>
             <a:fld id="{BB4D6562-5A70-4DF7-9752-E74BCA214492}" type="datetimeFigureOut">
               <a:rPr lang="en-IN" smtClean="0"/>
-              <a:t>05-03-2023</a:t>
+              <a:t>06-03-2023</a:t>
             </a:fld>
             <a:endParaRPr lang="en-IN"/>
           </a:p>
@@ -1152,7 +1157,7 @@
           <a:p>
             <a:fld id="{BB4D6562-5A70-4DF7-9752-E74BCA214492}" type="datetimeFigureOut">
               <a:rPr lang="en-IN" smtClean="0"/>
-              <a:t>05-03-2023</a:t>
+              <a:t>06-03-2023</a:t>
             </a:fld>
             <a:endParaRPr lang="en-IN"/>
           </a:p>
@@ -1420,7 +1425,7 @@
           <a:p>
             <a:fld id="{BB4D6562-5A70-4DF7-9752-E74BCA214492}" type="datetimeFigureOut">
               <a:rPr lang="en-IN" smtClean="0"/>
-              <a:t>05-03-2023</a:t>
+              <a:t>06-03-2023</a:t>
             </a:fld>
             <a:endParaRPr lang="en-IN"/>
           </a:p>
@@ -1835,7 +1840,7 @@
           <a:p>
             <a:fld id="{BB4D6562-5A70-4DF7-9752-E74BCA214492}" type="datetimeFigureOut">
               <a:rPr lang="en-IN" smtClean="0"/>
-              <a:t>05-03-2023</a:t>
+              <a:t>06-03-2023</a:t>
             </a:fld>
             <a:endParaRPr lang="en-IN"/>
           </a:p>
@@ -1977,7 +1982,7 @@
           <a:p>
             <a:fld id="{BB4D6562-5A70-4DF7-9752-E74BCA214492}" type="datetimeFigureOut">
               <a:rPr lang="en-IN" smtClean="0"/>
-              <a:t>05-03-2023</a:t>
+              <a:t>06-03-2023</a:t>
             </a:fld>
             <a:endParaRPr lang="en-IN"/>
           </a:p>
@@ -2090,7 +2095,7 @@
           <a:p>
             <a:fld id="{BB4D6562-5A70-4DF7-9752-E74BCA214492}" type="datetimeFigureOut">
               <a:rPr lang="en-IN" smtClean="0"/>
-              <a:t>05-03-2023</a:t>
+              <a:t>06-03-2023</a:t>
             </a:fld>
             <a:endParaRPr lang="en-IN"/>
           </a:p>
@@ -2403,7 +2408,7 @@
           <a:p>
             <a:fld id="{BB4D6562-5A70-4DF7-9752-E74BCA214492}" type="datetimeFigureOut">
               <a:rPr lang="en-IN" smtClean="0"/>
-              <a:t>05-03-2023</a:t>
+              <a:t>06-03-2023</a:t>
             </a:fld>
             <a:endParaRPr lang="en-IN"/>
           </a:p>
@@ -2692,7 +2697,7 @@
           <a:p>
             <a:fld id="{BB4D6562-5A70-4DF7-9752-E74BCA214492}" type="datetimeFigureOut">
               <a:rPr lang="en-IN" smtClean="0"/>
-              <a:t>05-03-2023</a:t>
+              <a:t>06-03-2023</a:t>
             </a:fld>
             <a:endParaRPr lang="en-IN"/>
           </a:p>
@@ -2935,7 +2940,7 @@
           <a:p>
             <a:fld id="{BB4D6562-5A70-4DF7-9752-E74BCA214492}" type="datetimeFigureOut">
               <a:rPr lang="en-IN" smtClean="0"/>
-              <a:t>05-03-2023</a:t>
+              <a:t>06-03-2023</a:t>
             </a:fld>
             <a:endParaRPr lang="en-IN"/>
           </a:p>
@@ -4751,10 +4756,10 @@
       </p:sp>
       <p:pic>
         <p:nvPicPr>
-          <p:cNvPr id="5" name="Content Placeholder 4">
-            <a:extLst>
-              <a:ext uri="{FF2B5EF4-FFF2-40B4-BE49-F238E27FC236}">
-                <a16:creationId xmlns:a16="http://schemas.microsoft.com/office/drawing/2014/main" id="{7A5B668C-91E0-4FF9-92B5-7B1453FAF3E2}"/>
+          <p:cNvPr id="7" name="Content Placeholder 6">
+            <a:extLst>
+              <a:ext uri="{FF2B5EF4-FFF2-40B4-BE49-F238E27FC236}">
+                <a16:creationId xmlns:a16="http://schemas.microsoft.com/office/drawing/2014/main" id="{37A7576D-BB4F-4CEB-B0C9-A8E758FA020E}"/>
               </a:ext>
             </a:extLst>
           </p:cNvPr>
@@ -4773,8 +4778,8 @@
         </p:blipFill>
         <p:spPr>
           <a:xfrm>
-            <a:off x="3574751" y="365124"/>
-            <a:ext cx="7779049" cy="6023149"/>
+            <a:off x="4744173" y="225022"/>
+            <a:ext cx="6967664" cy="6407954"/>
           </a:xfrm>
         </p:spPr>
       </p:pic>

</xml_diff>

<commit_message>
fix: Change Sprint2 screenshot in Milestone-2 submission
</commit_message>
<xml_diff>
--- a/project/documents/m3-ScheduleAndDesign/ScheduleAndDesign.pptx
+++ b/project/documents/m3-ScheduleAndDesign/ScheduleAndDesign.pptx
@@ -4480,10 +4480,10 @@
       </p:sp>
       <p:pic>
         <p:nvPicPr>
-          <p:cNvPr id="17" name="Content Placeholder 16">
-            <a:extLst>
-              <a:ext uri="{FF2B5EF4-FFF2-40B4-BE49-F238E27FC236}">
-                <a16:creationId xmlns:a16="http://schemas.microsoft.com/office/drawing/2014/main" id="{67B61A7B-3F1F-4BDD-8955-FF1441034342}"/>
+          <p:cNvPr id="6" name="Content Placeholder 5">
+            <a:extLst>
+              <a:ext uri="{FF2B5EF4-FFF2-40B4-BE49-F238E27FC236}">
+                <a16:creationId xmlns:a16="http://schemas.microsoft.com/office/drawing/2014/main" id="{115AC33C-2972-40D5-B125-0345473C9907}"/>
               </a:ext>
             </a:extLst>
           </p:cNvPr>
@@ -4502,8 +4502,8 @@
         </p:blipFill>
         <p:spPr>
           <a:xfrm>
-            <a:off x="1980625" y="1943607"/>
-            <a:ext cx="8230749" cy="4115374"/>
+            <a:off x="2083608" y="1825625"/>
+            <a:ext cx="8024784" cy="4351338"/>
           </a:xfrm>
         </p:spPr>
       </p:pic>

</xml_diff>